<commit_message>
Update of Kangping Files
</commit_message>
<xml_diff>
--- a/File Diary/2023/Jan 2023/WDR81-WDR91 meeting 1.pptx
+++ b/File Diary/2023/Jan 2023/WDR81-WDR91 meeting 1.pptx
@@ -203,7 +203,7 @@
           <a:p>
             <a:fld id="{C9BEE1CD-6EDF-5C43-ACE9-942F6C137C3E}" type="datetimeFigureOut">
               <a:rPr lang="en-US" smtClean="0"/>
-              <a:t>1/20/23</a:t>
+              <a:t>1/23/23</a:t>
             </a:fld>
             <a:endParaRPr lang="en-US"/>
           </a:p>
@@ -3200,7 +3200,7 @@
         </p:blipFill>
         <p:spPr>
           <a:xfrm>
-            <a:off x="4777597" y="1095469"/>
+            <a:off x="4687066" y="1095469"/>
             <a:ext cx="4087126" cy="3423341"/>
           </a:xfrm>
           <a:prstGeom prst="rect">
@@ -3208,164 +3208,185 @@
           </a:prstGeom>
         </p:spPr>
       </p:pic>
-      <p:pic>
-        <p:nvPicPr>
-          <p:cNvPr id="6" name="图片 5" descr="图片包含 图示&#10;&#10;描述已自动生成">
+      <p:grpSp>
+        <p:nvGrpSpPr>
+          <p:cNvPr id="2" name="组合 1">
             <a:extLst>
               <a:ext uri="{FF2B5EF4-FFF2-40B4-BE49-F238E27FC236}">
-                <a16:creationId xmlns:a16="http://schemas.microsoft.com/office/drawing/2014/main" id="{A8C50F81-BFA5-AF5B-D56D-36EEA2697371}"/>
+                <a16:creationId xmlns:a16="http://schemas.microsoft.com/office/drawing/2014/main" id="{58B32B6B-272B-2079-639E-F00C3FBDE3E9}"/>
               </a:ext>
             </a:extLst>
           </p:cNvPr>
-          <p:cNvPicPr>
-            <a:picLocks noChangeAspect="1"/>
-          </p:cNvPicPr>
+          <p:cNvGrpSpPr/>
           <p:nvPr/>
-        </p:nvPicPr>
-        <p:blipFill>
-          <a:blip r:embed="rId4"/>
-          <a:stretch>
-            <a:fillRect/>
-          </a:stretch>
-        </p:blipFill>
-        <p:spPr>
+        </p:nvGrpSpPr>
+        <p:grpSpPr>
           <a:xfrm>
-            <a:off x="216000" y="898142"/>
-            <a:ext cx="4463797" cy="3966550"/>
+            <a:off x="541927" y="1265626"/>
+            <a:ext cx="4087126" cy="3689596"/>
+            <a:chOff x="216000" y="898142"/>
+            <a:chExt cx="4463797" cy="3966550"/>
           </a:xfrm>
-          <a:prstGeom prst="rect">
-            <a:avLst/>
-          </a:prstGeom>
-        </p:spPr>
-      </p:pic>
-      <p:sp>
-        <p:nvSpPr>
-          <p:cNvPr id="7" name="椭圆 6">
-            <a:extLst>
-              <a:ext uri="{FF2B5EF4-FFF2-40B4-BE49-F238E27FC236}">
-                <a16:creationId xmlns:a16="http://schemas.microsoft.com/office/drawing/2014/main" id="{C94CB22F-7E48-09FA-87A3-A6748B5CBDB0}"/>
-              </a:ext>
-            </a:extLst>
-          </p:cNvPr>
-          <p:cNvSpPr/>
-          <p:nvPr/>
-        </p:nvSpPr>
-        <p:spPr>
-          <a:xfrm>
-            <a:off x="4010212" y="2976283"/>
-            <a:ext cx="424330" cy="340659"/>
-          </a:xfrm>
-          <a:prstGeom prst="ellipse">
-            <a:avLst/>
-          </a:prstGeom>
-          <a:noFill/>
-          <a:ln>
-            <a:solidFill>
-              <a:srgbClr val="FF0000"/>
-            </a:solidFill>
-          </a:ln>
-        </p:spPr>
-        <p:style>
-          <a:lnRef idx="2">
-            <a:schemeClr val="accent1">
-              <a:shade val="50000"/>
-            </a:schemeClr>
-          </a:lnRef>
-          <a:fillRef idx="1">
-            <a:schemeClr val="accent1"/>
-          </a:fillRef>
-          <a:effectRef idx="0">
-            <a:schemeClr val="accent1"/>
-          </a:effectRef>
-          <a:fontRef idx="minor">
-            <a:schemeClr val="lt1"/>
-          </a:fontRef>
-        </p:style>
-        <p:txBody>
-          <a:bodyPr rtlCol="0" anchor="ctr"/>
-          <a:lstStyle/>
-          <a:p>
-            <a:pPr algn="ctr"/>
-            <a:endParaRPr kumimoji="1" lang="zh-CN" altLang="en-US">
-              <a:ln w="0"/>
+        </p:grpSpPr>
+        <p:pic>
+          <p:nvPicPr>
+            <p:cNvPr id="6" name="图片 5" descr="图片包含 图示&#10;&#10;描述已自动生成">
+              <a:extLst>
+                <a:ext uri="{FF2B5EF4-FFF2-40B4-BE49-F238E27FC236}">
+                  <a16:creationId xmlns:a16="http://schemas.microsoft.com/office/drawing/2014/main" id="{A8C50F81-BFA5-AF5B-D56D-36EEA2697371}"/>
+                </a:ext>
+              </a:extLst>
+            </p:cNvPr>
+            <p:cNvPicPr>
+              <a:picLocks noChangeAspect="1"/>
+            </p:cNvPicPr>
+            <p:nvPr/>
+          </p:nvPicPr>
+          <p:blipFill>
+            <a:blip r:embed="rId4"/>
+            <a:stretch>
+              <a:fillRect/>
+            </a:stretch>
+          </p:blipFill>
+          <p:spPr>
+            <a:xfrm>
+              <a:off x="216000" y="898142"/>
+              <a:ext cx="4463797" cy="3966550"/>
+            </a:xfrm>
+            <a:prstGeom prst="rect">
+              <a:avLst/>
+            </a:prstGeom>
+          </p:spPr>
+        </p:pic>
+        <p:sp>
+          <p:nvSpPr>
+            <p:cNvPr id="7" name="椭圆 6">
+              <a:extLst>
+                <a:ext uri="{FF2B5EF4-FFF2-40B4-BE49-F238E27FC236}">
+                  <a16:creationId xmlns:a16="http://schemas.microsoft.com/office/drawing/2014/main" id="{C94CB22F-7E48-09FA-87A3-A6748B5CBDB0}"/>
+                </a:ext>
+              </a:extLst>
+            </p:cNvPr>
+            <p:cNvSpPr/>
+            <p:nvPr/>
+          </p:nvSpPr>
+          <p:spPr>
+            <a:xfrm>
+              <a:off x="4010212" y="2976283"/>
+              <a:ext cx="424330" cy="340659"/>
+            </a:xfrm>
+            <a:prstGeom prst="ellipse">
+              <a:avLst/>
+            </a:prstGeom>
+            <a:noFill/>
+            <a:ln>
               <a:solidFill>
-                <a:schemeClr val="tx1"/>
+                <a:srgbClr val="FF0000"/>
               </a:solidFill>
-              <a:effectLst>
-                <a:outerShdw blurRad="38100" dist="19050" dir="2700000" algn="tl" rotWithShape="0">
-                  <a:schemeClr val="dk1">
-                    <a:alpha val="40000"/>
-                  </a:schemeClr>
-                </a:outerShdw>
-              </a:effectLst>
-            </a:endParaRPr>
-          </a:p>
-        </p:txBody>
-      </p:sp>
-      <p:sp>
-        <p:nvSpPr>
-          <p:cNvPr id="8" name="椭圆 7">
-            <a:extLst>
-              <a:ext uri="{FF2B5EF4-FFF2-40B4-BE49-F238E27FC236}">
-                <a16:creationId xmlns:a16="http://schemas.microsoft.com/office/drawing/2014/main" id="{5B5F8E90-6276-389E-D523-A9261956F931}"/>
-              </a:ext>
-            </a:extLst>
-          </p:cNvPr>
-          <p:cNvSpPr/>
-          <p:nvPr/>
-        </p:nvSpPr>
-        <p:spPr>
-          <a:xfrm>
-            <a:off x="4092202" y="3797104"/>
-            <a:ext cx="424330" cy="340659"/>
-          </a:xfrm>
-          <a:prstGeom prst="ellipse">
-            <a:avLst/>
-          </a:prstGeom>
-          <a:noFill/>
-          <a:ln>
-            <a:solidFill>
-              <a:srgbClr val="FF0000"/>
-            </a:solidFill>
-          </a:ln>
-        </p:spPr>
-        <p:style>
-          <a:lnRef idx="2">
-            <a:schemeClr val="accent1">
-              <a:shade val="50000"/>
-            </a:schemeClr>
-          </a:lnRef>
-          <a:fillRef idx="1">
-            <a:schemeClr val="accent1"/>
-          </a:fillRef>
-          <a:effectRef idx="0">
-            <a:schemeClr val="accent1"/>
-          </a:effectRef>
-          <a:fontRef idx="minor">
-            <a:schemeClr val="lt1"/>
-          </a:fontRef>
-        </p:style>
-        <p:txBody>
-          <a:bodyPr rtlCol="0" anchor="ctr"/>
-          <a:lstStyle/>
-          <a:p>
-            <a:pPr algn="ctr"/>
-            <a:endParaRPr kumimoji="1" lang="zh-CN" altLang="en-US">
-              <a:ln w="0"/>
+            </a:ln>
+          </p:spPr>
+          <p:style>
+            <a:lnRef idx="2">
+              <a:schemeClr val="accent1">
+                <a:shade val="50000"/>
+              </a:schemeClr>
+            </a:lnRef>
+            <a:fillRef idx="1">
+              <a:schemeClr val="accent1"/>
+            </a:fillRef>
+            <a:effectRef idx="0">
+              <a:schemeClr val="accent1"/>
+            </a:effectRef>
+            <a:fontRef idx="minor">
+              <a:schemeClr val="lt1"/>
+            </a:fontRef>
+          </p:style>
+          <p:txBody>
+            <a:bodyPr rtlCol="0" anchor="ctr"/>
+            <a:lstStyle/>
+            <a:p>
+              <a:pPr algn="ctr"/>
+              <a:endParaRPr kumimoji="1" lang="zh-CN" altLang="en-US">
+                <a:ln w="0"/>
+                <a:solidFill>
+                  <a:schemeClr val="tx1"/>
+                </a:solidFill>
+                <a:effectLst>
+                  <a:outerShdw blurRad="38100" dist="19050" dir="2700000" algn="tl" rotWithShape="0">
+                    <a:schemeClr val="dk1">
+                      <a:alpha val="40000"/>
+                    </a:schemeClr>
+                  </a:outerShdw>
+                </a:effectLst>
+              </a:endParaRPr>
+            </a:p>
+          </p:txBody>
+        </p:sp>
+        <p:sp>
+          <p:nvSpPr>
+            <p:cNvPr id="8" name="椭圆 7">
+              <a:extLst>
+                <a:ext uri="{FF2B5EF4-FFF2-40B4-BE49-F238E27FC236}">
+                  <a16:creationId xmlns:a16="http://schemas.microsoft.com/office/drawing/2014/main" id="{5B5F8E90-6276-389E-D523-A9261956F931}"/>
+                </a:ext>
+              </a:extLst>
+            </p:cNvPr>
+            <p:cNvSpPr/>
+            <p:nvPr/>
+          </p:nvSpPr>
+          <p:spPr>
+            <a:xfrm>
+              <a:off x="4092202" y="3797104"/>
+              <a:ext cx="424330" cy="340659"/>
+            </a:xfrm>
+            <a:prstGeom prst="ellipse">
+              <a:avLst/>
+            </a:prstGeom>
+            <a:noFill/>
+            <a:ln>
               <a:solidFill>
-                <a:schemeClr val="tx1"/>
+                <a:srgbClr val="FF0000"/>
               </a:solidFill>
-              <a:effectLst>
-                <a:outerShdw blurRad="38100" dist="19050" dir="2700000" algn="tl" rotWithShape="0">
-                  <a:schemeClr val="dk1">
-                    <a:alpha val="40000"/>
-                  </a:schemeClr>
-                </a:outerShdw>
-              </a:effectLst>
-            </a:endParaRPr>
-          </a:p>
-        </p:txBody>
-      </p:sp>
+            </a:ln>
+          </p:spPr>
+          <p:style>
+            <a:lnRef idx="2">
+              <a:schemeClr val="accent1">
+                <a:shade val="50000"/>
+              </a:schemeClr>
+            </a:lnRef>
+            <a:fillRef idx="1">
+              <a:schemeClr val="accent1"/>
+            </a:fillRef>
+            <a:effectRef idx="0">
+              <a:schemeClr val="accent1"/>
+            </a:effectRef>
+            <a:fontRef idx="minor">
+              <a:schemeClr val="lt1"/>
+            </a:fontRef>
+          </p:style>
+          <p:txBody>
+            <a:bodyPr rtlCol="0" anchor="ctr"/>
+            <a:lstStyle/>
+            <a:p>
+              <a:pPr algn="ctr"/>
+              <a:endParaRPr kumimoji="1" lang="zh-CN" altLang="en-US">
+                <a:ln w="0"/>
+                <a:solidFill>
+                  <a:schemeClr val="tx1"/>
+                </a:solidFill>
+                <a:effectLst>
+                  <a:outerShdw blurRad="38100" dist="19050" dir="2700000" algn="tl" rotWithShape="0">
+                    <a:schemeClr val="dk1">
+                      <a:alpha val="40000"/>
+                    </a:schemeClr>
+                  </a:outerShdw>
+                </a:effectLst>
+              </a:endParaRPr>
+            </a:p>
+          </p:txBody>
+        </p:sp>
+      </p:grpSp>
       <p:sp>
         <p:nvSpPr>
           <p:cNvPr id="9" name="文本框 8">
@@ -3380,8 +3401,8 @@
         </p:nvSpPr>
         <p:spPr>
           <a:xfrm>
-            <a:off x="5428648" y="4644184"/>
-            <a:ext cx="1145406" cy="215444"/>
+            <a:off x="4834554" y="4381641"/>
+            <a:ext cx="4246075" cy="707886"/>
           </a:xfrm>
           <a:prstGeom prst="rect">
             <a:avLst/>
@@ -3396,9 +3417,137 @@
           <a:p>
             <a:r>
               <a:rPr kumimoji="1" lang="en-US" altLang="zh-CN" sz="800" dirty="0"/>
-              <a:t>Wang et al., 2021</a:t>
+              <a:t>Genetic Screens Identify Host Factors for SARS-CoV-2 and Common Cold Coronaviruses, R. Wang, , C. R. </a:t>
+            </a:r>
+            <a:r>
+              <a:rPr kumimoji="1" lang="en-US" altLang="zh-CN" sz="800" dirty="0" err="1"/>
+              <a:t>Simoneau</a:t>
+            </a:r>
+            <a:r>
+              <a:rPr kumimoji="1" lang="en-US" altLang="zh-CN" sz="800" dirty="0"/>
+              <a:t>, J. </a:t>
+            </a:r>
+            <a:r>
+              <a:rPr kumimoji="1" lang="en-US" altLang="zh-CN" sz="800" dirty="0" err="1"/>
+              <a:t>Kulsuptrakul</a:t>
+            </a:r>
+            <a:r>
+              <a:rPr kumimoji="1" lang="en-US" altLang="zh-CN" sz="800" dirty="0"/>
+              <a:t>, M. </a:t>
+            </a:r>
+            <a:r>
+              <a:rPr kumimoji="1" lang="en-US" altLang="zh-CN" sz="800" dirty="0" err="1"/>
+              <a:t>Bouhaddou</a:t>
+            </a:r>
+            <a:r>
+              <a:rPr kumimoji="1" lang="en-US" altLang="zh-CN" sz="800" dirty="0"/>
+              <a:t>, K.A. </a:t>
+            </a:r>
+            <a:r>
+              <a:rPr kumimoji="1" lang="en-US" altLang="zh-CN" sz="800" dirty="0" err="1"/>
+              <a:t>Travisano</a:t>
+            </a:r>
+            <a:r>
+              <a:rPr kumimoji="1" lang="en-US" altLang="zh-CN" sz="800" dirty="0"/>
+              <a:t>, J. M. Hayashi, J. Carlson-</a:t>
+            </a:r>
+            <a:r>
+              <a:rPr kumimoji="1" lang="en-US" altLang="zh-CN" sz="800" dirty="0" err="1"/>
+              <a:t>Stevermer</a:t>
+            </a:r>
+            <a:r>
+              <a:rPr kumimoji="1" lang="en-US" altLang="zh-CN" sz="800" dirty="0"/>
+              <a:t>, J. R. Zenger, C. M. Richards, P. </a:t>
+            </a:r>
+            <a:r>
+              <a:rPr kumimoji="1" lang="en-US" altLang="zh-CN" sz="800" dirty="0" err="1"/>
+              <a:t>Fozouni</a:t>
+            </a:r>
+            <a:r>
+              <a:rPr kumimoji="1" lang="en-US" altLang="zh-CN" sz="800" dirty="0"/>
+              <a:t>,  J. Oki, L. Rodriguez, B. </a:t>
+            </a:r>
+            <a:r>
+              <a:rPr kumimoji="1" lang="en-US" altLang="zh-CN" sz="800" dirty="0" err="1"/>
+              <a:t>Joehnk</a:t>
+            </a:r>
+            <a:r>
+              <a:rPr kumimoji="1" lang="en-US" altLang="zh-CN" sz="800" dirty="0"/>
+              <a:t>, K. Walcott, K. Holden, A. Sil, J.E. </a:t>
+            </a:r>
+            <a:r>
+              <a:rPr kumimoji="1" lang="en-US" altLang="zh-CN" sz="800" dirty="0" err="1"/>
+              <a:t>Carette</a:t>
+            </a:r>
+            <a:r>
+              <a:rPr kumimoji="1" lang="en-US" altLang="zh-CN" sz="800" dirty="0"/>
+              <a:t>, N. J. </a:t>
+            </a:r>
+            <a:r>
+              <a:rPr kumimoji="1" lang="en-US" altLang="zh-CN" sz="800" dirty="0" err="1"/>
+              <a:t>Krogan</a:t>
+            </a:r>
+            <a:r>
+              <a:rPr kumimoji="1" lang="en-US" altLang="zh-CN" sz="800" dirty="0"/>
+              <a:t>, M. Ott, M. and A. S.PUSCHNIK, </a:t>
+            </a:r>
+            <a:r>
+              <a:rPr kumimoji="1" lang="en-US" altLang="zh-CN" sz="800" i="1" dirty="0"/>
+              <a:t>Cell.</a:t>
+            </a:r>
+            <a:r>
+              <a:rPr kumimoji="1" lang="en-US" altLang="zh-CN" sz="800" dirty="0"/>
+              <a:t>  </a:t>
+            </a:r>
+            <a:r>
+              <a:rPr kumimoji="1" lang="en-US" altLang="zh-CN" sz="800" b="1" dirty="0"/>
+              <a:t>2021, </a:t>
+            </a:r>
+            <a:r>
+              <a:rPr kumimoji="1" lang="en-US" altLang="zh-CN" sz="800" i="1" dirty="0"/>
+              <a:t>184</a:t>
+            </a:r>
+            <a:r>
+              <a:rPr kumimoji="1" lang="en-US" altLang="zh-CN" sz="800" dirty="0"/>
+              <a:t>, 106-119. (DOI: 10.1016/j.cell.2020.12.004)</a:t>
             </a:r>
             <a:endParaRPr kumimoji="1" lang="zh-CN" altLang="en-US" sz="800" dirty="0"/>
+          </a:p>
+        </p:txBody>
+      </p:sp>
+      <p:sp>
+        <p:nvSpPr>
+          <p:cNvPr id="5" name="文本框 4">
+            <a:extLst>
+              <a:ext uri="{FF2B5EF4-FFF2-40B4-BE49-F238E27FC236}">
+                <a16:creationId xmlns:a16="http://schemas.microsoft.com/office/drawing/2014/main" id="{6F66F0F5-0740-F9DA-8FB3-E7C7B1151DC6}"/>
+              </a:ext>
+            </a:extLst>
+          </p:cNvPr>
+          <p:cNvSpPr txBox="1"/>
+          <p:nvPr/>
+        </p:nvSpPr>
+        <p:spPr>
+          <a:xfrm>
+            <a:off x="222971" y="805762"/>
+            <a:ext cx="8272329" cy="369332"/>
+          </a:xfrm>
+          <a:prstGeom prst="rect">
+            <a:avLst/>
+          </a:prstGeom>
+          <a:noFill/>
+        </p:spPr>
+        <p:txBody>
+          <a:bodyPr wrap="none" rtlCol="0">
+            <a:spAutoFit/>
+          </a:bodyPr>
+          <a:lstStyle/>
+          <a:p>
+            <a:r>
+              <a:rPr kumimoji="1" lang="en-US" altLang="zh-CN" dirty="0"/>
+              <a:t>Gene Screening of WDR81-WDR91 in Virial Infection and Relevance of WDR81-WDR91 </a:t>
+            </a:r>
+            <a:endParaRPr kumimoji="1" lang="zh-CN" altLang="en-US" dirty="0"/>
           </a:p>
         </p:txBody>
       </p:sp>
@@ -3469,129 +3618,150 @@
           </a:p>
         </p:txBody>
       </p:sp>
-      <p:pic>
-        <p:nvPicPr>
-          <p:cNvPr id="5" name="图片 4" descr="图示&#10;&#10;描述已自动生成">
+      <p:grpSp>
+        <p:nvGrpSpPr>
+          <p:cNvPr id="2" name="组合 1">
             <a:extLst>
               <a:ext uri="{FF2B5EF4-FFF2-40B4-BE49-F238E27FC236}">
-                <a16:creationId xmlns:a16="http://schemas.microsoft.com/office/drawing/2014/main" id="{A93F1E0E-B03A-59F2-ECD1-011D131C2D9B}"/>
+                <a16:creationId xmlns:a16="http://schemas.microsoft.com/office/drawing/2014/main" id="{FBEA41E1-DEFB-A5AE-6496-57278540F923}"/>
               </a:ext>
             </a:extLst>
           </p:cNvPr>
-          <p:cNvPicPr>
-            <a:picLocks noChangeAspect="1"/>
-          </p:cNvPicPr>
+          <p:cNvGrpSpPr/>
           <p:nvPr/>
-        </p:nvPicPr>
-        <p:blipFill rotWithShape="1">
-          <a:blip r:embed="rId3"/>
-          <a:srcRect l="17587" t="-324" r="14250"/>
-          <a:stretch/>
-        </p:blipFill>
-        <p:spPr>
+        </p:nvGrpSpPr>
+        <p:grpSpPr>
           <a:xfrm>
-            <a:off x="492174" y="778664"/>
-            <a:ext cx="4204335" cy="4254713"/>
+            <a:off x="311109" y="1289786"/>
+            <a:ext cx="3863262" cy="3743591"/>
+            <a:chOff x="492174" y="778664"/>
+            <a:chExt cx="4204335" cy="4254713"/>
           </a:xfrm>
-          <a:prstGeom prst="rect">
-            <a:avLst/>
-          </a:prstGeom>
-        </p:spPr>
-      </p:pic>
-      <p:sp>
-        <p:nvSpPr>
-          <p:cNvPr id="13" name="右弧形箭头 12">
-            <a:extLst>
-              <a:ext uri="{FF2B5EF4-FFF2-40B4-BE49-F238E27FC236}">
-                <a16:creationId xmlns:a16="http://schemas.microsoft.com/office/drawing/2014/main" id="{52DE6946-6EC3-4246-160F-305DDE4432F0}"/>
-              </a:ext>
-            </a:extLst>
-          </p:cNvPr>
-          <p:cNvSpPr/>
-          <p:nvPr/>
-        </p:nvSpPr>
-        <p:spPr>
-          <a:xfrm rot="1379693">
-            <a:off x="1568299" y="2331118"/>
-            <a:ext cx="211756" cy="519764"/>
-          </a:xfrm>
-          <a:prstGeom prst="curvedRightArrow">
-            <a:avLst/>
-          </a:prstGeom>
-          <a:solidFill>
-            <a:srgbClr val="FF0000"/>
-          </a:solidFill>
-          <a:ln>
+        </p:grpSpPr>
+        <p:pic>
+          <p:nvPicPr>
+            <p:cNvPr id="5" name="图片 4" descr="图示&#10;&#10;描述已自动生成">
+              <a:extLst>
+                <a:ext uri="{FF2B5EF4-FFF2-40B4-BE49-F238E27FC236}">
+                  <a16:creationId xmlns:a16="http://schemas.microsoft.com/office/drawing/2014/main" id="{A93F1E0E-B03A-59F2-ECD1-011D131C2D9B}"/>
+                </a:ext>
+              </a:extLst>
+            </p:cNvPr>
+            <p:cNvPicPr>
+              <a:picLocks noChangeAspect="1"/>
+            </p:cNvPicPr>
+            <p:nvPr/>
+          </p:nvPicPr>
+          <p:blipFill rotWithShape="1">
+            <a:blip r:embed="rId3"/>
+            <a:srcRect l="17587" t="-324" r="14250"/>
+            <a:stretch/>
+          </p:blipFill>
+          <p:spPr>
+            <a:xfrm>
+              <a:off x="492174" y="778664"/>
+              <a:ext cx="4204335" cy="4254713"/>
+            </a:xfrm>
+            <a:prstGeom prst="rect">
+              <a:avLst/>
+            </a:prstGeom>
+          </p:spPr>
+        </p:pic>
+        <p:sp>
+          <p:nvSpPr>
+            <p:cNvPr id="13" name="右弧形箭头 12">
+              <a:extLst>
+                <a:ext uri="{FF2B5EF4-FFF2-40B4-BE49-F238E27FC236}">
+                  <a16:creationId xmlns:a16="http://schemas.microsoft.com/office/drawing/2014/main" id="{52DE6946-6EC3-4246-160F-305DDE4432F0}"/>
+                </a:ext>
+              </a:extLst>
+            </p:cNvPr>
+            <p:cNvSpPr/>
+            <p:nvPr/>
+          </p:nvSpPr>
+          <p:spPr>
+            <a:xfrm rot="1379693">
+              <a:off x="1568299" y="2331118"/>
+              <a:ext cx="211756" cy="519764"/>
+            </a:xfrm>
+            <a:prstGeom prst="curvedRightArrow">
+              <a:avLst/>
+            </a:prstGeom>
             <a:solidFill>
               <a:srgbClr val="FF0000"/>
             </a:solidFill>
-          </a:ln>
-        </p:spPr>
-        <p:style>
-          <a:lnRef idx="2">
-            <a:schemeClr val="accent1">
-              <a:shade val="50000"/>
-            </a:schemeClr>
-          </a:lnRef>
-          <a:fillRef idx="1">
-            <a:schemeClr val="accent1"/>
-          </a:fillRef>
-          <a:effectRef idx="0">
-            <a:schemeClr val="accent1"/>
-          </a:effectRef>
-          <a:fontRef idx="minor">
-            <a:schemeClr val="lt1"/>
-          </a:fontRef>
-        </p:style>
-        <p:txBody>
-          <a:bodyPr rtlCol="0" anchor="ctr"/>
-          <a:lstStyle/>
-          <a:p>
-            <a:pPr algn="ctr"/>
-            <a:endParaRPr kumimoji="1" lang="zh-CN" altLang="en-US">
+            <a:ln>
               <a:solidFill>
-                <a:schemeClr val="tx1"/>
+                <a:srgbClr val="FF0000"/>
               </a:solidFill>
-            </a:endParaRPr>
-          </a:p>
-        </p:txBody>
-      </p:sp>
-      <p:sp>
-        <p:nvSpPr>
-          <p:cNvPr id="14" name="文本框 13">
-            <a:extLst>
-              <a:ext uri="{FF2B5EF4-FFF2-40B4-BE49-F238E27FC236}">
-                <a16:creationId xmlns:a16="http://schemas.microsoft.com/office/drawing/2014/main" id="{DC146AC2-D761-40F3-356A-34E492591BA3}"/>
-              </a:ext>
-            </a:extLst>
-          </p:cNvPr>
-          <p:cNvSpPr txBox="1"/>
-          <p:nvPr/>
-        </p:nvSpPr>
-        <p:spPr>
-          <a:xfrm>
-            <a:off x="492174" y="1875901"/>
-            <a:ext cx="1232034" cy="923330"/>
-          </a:xfrm>
-          <a:prstGeom prst="rect">
-            <a:avLst/>
-          </a:prstGeom>
-          <a:noFill/>
-        </p:spPr>
-        <p:txBody>
-          <a:bodyPr wrap="square" rtlCol="0">
-            <a:spAutoFit/>
-          </a:bodyPr>
-          <a:lstStyle/>
-          <a:p>
-            <a:r>
-              <a:rPr kumimoji="1" lang="en-US" altLang="zh-CN" dirty="0"/>
-              <a:t>WDR81-WDR91 involved</a:t>
-            </a:r>
-            <a:endParaRPr kumimoji="1" lang="zh-CN" altLang="en-US" dirty="0"/>
-          </a:p>
-        </p:txBody>
-      </p:sp>
+            </a:ln>
+          </p:spPr>
+          <p:style>
+            <a:lnRef idx="2">
+              <a:schemeClr val="accent1">
+                <a:shade val="50000"/>
+              </a:schemeClr>
+            </a:lnRef>
+            <a:fillRef idx="1">
+              <a:schemeClr val="accent1"/>
+            </a:fillRef>
+            <a:effectRef idx="0">
+              <a:schemeClr val="accent1"/>
+            </a:effectRef>
+            <a:fontRef idx="minor">
+              <a:schemeClr val="lt1"/>
+            </a:fontRef>
+          </p:style>
+          <p:txBody>
+            <a:bodyPr rtlCol="0" anchor="ctr"/>
+            <a:lstStyle/>
+            <a:p>
+              <a:pPr algn="ctr"/>
+              <a:endParaRPr kumimoji="1" lang="zh-CN" altLang="en-US">
+                <a:solidFill>
+                  <a:schemeClr val="tx1"/>
+                </a:solidFill>
+              </a:endParaRPr>
+            </a:p>
+          </p:txBody>
+        </p:sp>
+        <p:sp>
+          <p:nvSpPr>
+            <p:cNvPr id="14" name="文本框 13">
+              <a:extLst>
+                <a:ext uri="{FF2B5EF4-FFF2-40B4-BE49-F238E27FC236}">
+                  <a16:creationId xmlns:a16="http://schemas.microsoft.com/office/drawing/2014/main" id="{DC146AC2-D761-40F3-356A-34E492591BA3}"/>
+                </a:ext>
+              </a:extLst>
+            </p:cNvPr>
+            <p:cNvSpPr txBox="1"/>
+            <p:nvPr/>
+          </p:nvSpPr>
+          <p:spPr>
+            <a:xfrm>
+              <a:off x="492174" y="1875901"/>
+              <a:ext cx="1232034" cy="923330"/>
+            </a:xfrm>
+            <a:prstGeom prst="rect">
+              <a:avLst/>
+            </a:prstGeom>
+            <a:noFill/>
+          </p:spPr>
+          <p:txBody>
+            <a:bodyPr wrap="square" rtlCol="0">
+              <a:spAutoFit/>
+            </a:bodyPr>
+            <a:lstStyle/>
+            <a:p>
+              <a:r>
+                <a:rPr kumimoji="1" lang="en-US" altLang="zh-CN" dirty="0"/>
+                <a:t>WDR81-WDR91 involved</a:t>
+              </a:r>
+              <a:endParaRPr kumimoji="1" lang="zh-CN" altLang="en-US" dirty="0"/>
+            </a:p>
+          </p:txBody>
+        </p:sp>
+      </p:grpSp>
       <p:pic>
         <p:nvPicPr>
           <p:cNvPr id="15" name="图片 14" descr="文本&#10;&#10;描述已自动生成">
@@ -3614,7 +3784,7 @@
         </p:blipFill>
         <p:spPr>
           <a:xfrm>
-            <a:off x="4788564" y="1289786"/>
+            <a:off x="4788564" y="1470851"/>
             <a:ext cx="3863262" cy="2326906"/>
           </a:xfrm>
           <a:prstGeom prst="rect">
@@ -3636,8 +3806,8 @@
         </p:nvSpPr>
         <p:spPr>
           <a:xfrm>
-            <a:off x="5130265" y="4600876"/>
-            <a:ext cx="2569946" cy="338554"/>
+            <a:off x="3920149" y="3824917"/>
+            <a:ext cx="5223851" cy="1323439"/>
           </a:xfrm>
           <a:prstGeom prst="rect">
             <a:avLst/>
@@ -3652,15 +3822,352 @@
           <a:p>
             <a:r>
               <a:rPr kumimoji="1" lang="en-US" altLang="zh-CN" sz="800" dirty="0"/>
-              <a:t>Scheme: Burkard et al., 2014</a:t>
-            </a:r>
-          </a:p>
-          <a:p>
+              <a:t>Scheme: Coronavirus Cell Entry Occurs through the Endo-/Lysosomal Pathway in a Proteolysis-Dependent Manner, C. Burkard, M. H. </a:t>
+            </a:r>
+            <a:r>
+              <a:rPr kumimoji="1" lang="en-US" altLang="zh-CN" sz="800" dirty="0" err="1"/>
+              <a:t>Verheije</a:t>
+            </a:r>
             <a:r>
               <a:rPr kumimoji="1" lang="en-US" altLang="zh-CN" sz="800" dirty="0"/>
-              <a:t>Text: Yang et al., 2022</a:t>
+              <a:t>, O. </a:t>
+            </a:r>
+            <a:r>
+              <a:rPr kumimoji="1" lang="en-US" altLang="zh-CN" sz="800" dirty="0" err="1"/>
+              <a:t>Wicht</a:t>
+            </a:r>
+            <a:r>
+              <a:rPr kumimoji="1" lang="en-US" altLang="zh-CN" sz="800" dirty="0"/>
+              <a:t>, S. I. van </a:t>
+            </a:r>
+            <a:r>
+              <a:rPr kumimoji="1" lang="en-US" altLang="zh-CN" sz="800" dirty="0" err="1"/>
+              <a:t>Kasteren</a:t>
+            </a:r>
+            <a:r>
+              <a:rPr kumimoji="1" lang="en-US" altLang="zh-CN" sz="800" dirty="0"/>
+              <a:t>, F. J. van </a:t>
+            </a:r>
+            <a:r>
+              <a:rPr kumimoji="1" lang="en-US" altLang="zh-CN" sz="800" dirty="0" err="1"/>
+              <a:t>Kuppeveld</a:t>
+            </a:r>
+            <a:r>
+              <a:rPr kumimoji="1" lang="en-US" altLang="zh-CN" sz="800" dirty="0"/>
+              <a:t>, B. L. </a:t>
+            </a:r>
+            <a:r>
+              <a:rPr kumimoji="1" lang="en-US" altLang="zh-CN" sz="800" dirty="0" err="1"/>
+              <a:t>Haagmans</a:t>
+            </a:r>
+            <a:r>
+              <a:rPr kumimoji="1" lang="en-US" altLang="zh-CN" sz="800" dirty="0"/>
+              <a:t>, L. </a:t>
+            </a:r>
+            <a:r>
+              <a:rPr kumimoji="1" lang="en-US" altLang="zh-CN" sz="800" dirty="0" err="1"/>
+              <a:t>Pelkmans</a:t>
+            </a:r>
+            <a:r>
+              <a:rPr kumimoji="1" lang="en-US" altLang="zh-CN" sz="800" dirty="0"/>
+              <a:t>, P. J. </a:t>
+            </a:r>
+            <a:r>
+              <a:rPr kumimoji="1" lang="en-US" altLang="zh-CN" sz="800" dirty="0" err="1"/>
+              <a:t>Rottier</a:t>
+            </a:r>
+            <a:r>
+              <a:rPr kumimoji="1" lang="en-US" altLang="zh-CN" sz="800" dirty="0"/>
+              <a:t>, B. J. Bosch and C. A. de </a:t>
+            </a:r>
+            <a:r>
+              <a:rPr kumimoji="1" lang="en-US" altLang="zh-CN" sz="800" dirty="0" err="1"/>
+              <a:t>Haan</a:t>
+            </a:r>
+            <a:r>
+              <a:rPr kumimoji="1" lang="en-US" altLang="zh-CN" sz="800" dirty="0"/>
+              <a:t>, </a:t>
+            </a:r>
+            <a:r>
+              <a:rPr kumimoji="1" lang="en-US" altLang="zh-CN" sz="800" i="1" dirty="0" err="1"/>
+              <a:t>PLoS</a:t>
+            </a:r>
+            <a:r>
+              <a:rPr kumimoji="1" lang="en-US" altLang="zh-CN" sz="800" i="1" dirty="0"/>
+              <a:t>. </a:t>
+            </a:r>
+            <a:r>
+              <a:rPr kumimoji="1" lang="en-US" altLang="zh-CN" sz="800" i="1" dirty="0" err="1"/>
+              <a:t>Pathog</a:t>
+            </a:r>
+            <a:r>
+              <a:rPr kumimoji="1" lang="en-US" altLang="zh-CN" sz="800" i="1" dirty="0"/>
+              <a:t>.</a:t>
+            </a:r>
+            <a:r>
+              <a:rPr kumimoji="1" lang="en-US" altLang="zh-CN" sz="800" dirty="0"/>
+              <a:t> </a:t>
+            </a:r>
+            <a:r>
+              <a:rPr kumimoji="1" lang="en-US" altLang="zh-CN" sz="800" b="1" dirty="0"/>
+              <a:t>2014,</a:t>
+            </a:r>
+            <a:r>
+              <a:rPr kumimoji="1" lang="en-US" altLang="zh-CN" sz="800" dirty="0"/>
+              <a:t> </a:t>
+            </a:r>
+            <a:r>
+              <a:rPr kumimoji="1" lang="en-US" altLang="zh-CN" sz="800" i="1" dirty="0"/>
+              <a:t>10</a:t>
+            </a:r>
+            <a:r>
+              <a:rPr kumimoji="1" lang="en-US" altLang="zh-CN" sz="800" dirty="0"/>
+              <a:t>, e1004502. (DOI: 10.1371/journal.ppat.1004502)</a:t>
+            </a:r>
+          </a:p>
+          <a:p>
+            <a:r>
+              <a:rPr lang="en-US" altLang="zh-CN" sz="800" dirty="0">
+                <a:effectLst/>
+                <a:cs typeface="Times New Roman" panose="02020603050405020304" pitchFamily="18" charset="0"/>
+              </a:rPr>
+              <a:t>A Genetic Screen Identifies a Critical Role for the WDR81-WDR91 Complex in the Trafficking and Degradation of </a:t>
+            </a:r>
+            <a:r>
+              <a:rPr lang="en-US" altLang="zh-CN" sz="800" dirty="0" err="1">
+                <a:effectLst/>
+                <a:cs typeface="Times New Roman" panose="02020603050405020304" pitchFamily="18" charset="0"/>
+              </a:rPr>
+              <a:t>Tetherin</a:t>
+            </a:r>
+            <a:r>
+              <a:rPr lang="en-US" altLang="zh-CN" sz="800" dirty="0">
+                <a:effectLst/>
+                <a:cs typeface="Times New Roman" panose="02020603050405020304" pitchFamily="18" charset="0"/>
+              </a:rPr>
+              <a:t>,  R. </a:t>
+            </a:r>
+            <a:r>
+              <a:rPr lang="en-US" altLang="zh-CN" sz="800" dirty="0" err="1">
+                <a:effectLst/>
+                <a:cs typeface="Times New Roman" panose="02020603050405020304" pitchFamily="18" charset="0"/>
+              </a:rPr>
+              <a:t>Rapiteanu</a:t>
+            </a:r>
+            <a:r>
+              <a:rPr lang="en-US" altLang="zh-CN" sz="800" dirty="0">
+                <a:effectLst/>
+                <a:cs typeface="Times New Roman" panose="02020603050405020304" pitchFamily="18" charset="0"/>
+              </a:rPr>
+              <a:t>, L. J. Davis, J. C. Williamson, R. T. Timms, J. Paul </a:t>
+            </a:r>
+            <a:r>
+              <a:rPr lang="en-US" altLang="zh-CN" sz="800" dirty="0" err="1">
+                <a:effectLst/>
+                <a:cs typeface="Times New Roman" panose="02020603050405020304" pitchFamily="18" charset="0"/>
+              </a:rPr>
+              <a:t>Luzio</a:t>
+            </a:r>
+            <a:r>
+              <a:rPr lang="en-US" altLang="zh-CN" sz="800" dirty="0">
+                <a:cs typeface="Times New Roman" panose="02020603050405020304" pitchFamily="18" charset="0"/>
+              </a:rPr>
+              <a:t> and</a:t>
+            </a:r>
+            <a:r>
+              <a:rPr lang="en-US" altLang="zh-CN" sz="800" dirty="0">
+                <a:effectLst/>
+                <a:cs typeface="Times New Roman" panose="02020603050405020304" pitchFamily="18" charset="0"/>
+              </a:rPr>
+              <a:t> P. J. Lehner, </a:t>
+            </a:r>
+            <a:r>
+              <a:rPr lang="en-US" altLang="zh-CN" sz="800" i="1" dirty="0">
+                <a:effectLst/>
+                <a:cs typeface="Times New Roman" panose="02020603050405020304" pitchFamily="18" charset="0"/>
+              </a:rPr>
+              <a:t>Traffic. </a:t>
+            </a:r>
+            <a:r>
+              <a:rPr lang="en-US" altLang="zh-CN" sz="800" b="1" dirty="0">
+                <a:effectLst/>
+                <a:cs typeface="Times New Roman" panose="02020603050405020304" pitchFamily="18" charset="0"/>
+              </a:rPr>
+              <a:t>2016</a:t>
+            </a:r>
+            <a:r>
+              <a:rPr lang="en-US" altLang="zh-CN" sz="800" dirty="0">
+                <a:effectLst/>
+                <a:cs typeface="Times New Roman" panose="02020603050405020304" pitchFamily="18" charset="0"/>
+              </a:rPr>
+              <a:t>, </a:t>
+            </a:r>
+            <a:r>
+              <a:rPr lang="en-US" altLang="zh-CN" sz="800" i="1" dirty="0">
+                <a:effectLst/>
+                <a:cs typeface="Times New Roman" panose="02020603050405020304" pitchFamily="18" charset="0"/>
+              </a:rPr>
+              <a:t>17</a:t>
+            </a:r>
+            <a:r>
+              <a:rPr lang="en-US" altLang="zh-CN" sz="800" dirty="0">
+                <a:effectLst/>
+                <a:cs typeface="Times New Roman" panose="02020603050405020304" pitchFamily="18" charset="0"/>
+              </a:rPr>
+              <a:t>, 940-958. (DOI: 10.1111/tra.12409)</a:t>
+            </a:r>
+          </a:p>
+          <a:p>
+            <a:r>
+              <a:rPr kumimoji="1" lang="en-US" altLang="zh-CN" sz="800" dirty="0"/>
+              <a:t>Text: </a:t>
+            </a:r>
+            <a:r>
+              <a:rPr lang="en-US" altLang="zh-CN" sz="800" dirty="0">
+                <a:effectLst/>
+                <a:cs typeface="Times New Roman" panose="02020603050405020304" pitchFamily="18" charset="0"/>
+              </a:rPr>
+              <a:t>B. Yang, Y. Jia, Y. Meng, Y. </a:t>
+            </a:r>
+            <a:r>
+              <a:rPr lang="en-US" altLang="zh-CN" sz="800" dirty="0" err="1">
+                <a:effectLst/>
+                <a:cs typeface="Times New Roman" panose="02020603050405020304" pitchFamily="18" charset="0"/>
+              </a:rPr>
+              <a:t>Xue</a:t>
+            </a:r>
+            <a:r>
+              <a:rPr lang="en-US" altLang="zh-CN" sz="800" dirty="0">
+                <a:effectLst/>
+                <a:cs typeface="Times New Roman" panose="02020603050405020304" pitchFamily="18" charset="0"/>
+              </a:rPr>
+              <a:t>, K. Liu, Y. Li, S. Liu, X. Li, K. Cui, L. Shang, T. Cheng, Z. Zhang, Y. Hou, X. Yang, H. Yan, L. Duan, Z. Tong, </a:t>
+            </a:r>
+            <a:r>
+              <a:rPr lang="en-US" altLang="zh-CN" sz="800" dirty="0" err="1">
+                <a:effectLst/>
+                <a:cs typeface="Times New Roman" panose="02020603050405020304" pitchFamily="18" charset="0"/>
+              </a:rPr>
+              <a:t>C.Wu</a:t>
+            </a:r>
+            <a:r>
+              <a:rPr lang="en-US" altLang="zh-CN" sz="800" dirty="0">
+                <a:effectLst/>
+                <a:cs typeface="Times New Roman" panose="02020603050405020304" pitchFamily="18" charset="0"/>
+              </a:rPr>
+              <a:t>, Z. </a:t>
+            </a:r>
+            <a:r>
+              <a:rPr lang="en-US" altLang="zh-CN" sz="800" dirty="0">
+                <a:cs typeface="Times New Roman" panose="02020603050405020304" pitchFamily="18" charset="0"/>
+              </a:rPr>
+              <a:t>Liu, S. Gao, S. </a:t>
+            </a:r>
+            <a:r>
+              <a:rPr lang="en-US" altLang="zh-CN" sz="800" dirty="0" err="1">
+                <a:cs typeface="Times New Roman" panose="02020603050405020304" pitchFamily="18" charset="0"/>
+              </a:rPr>
+              <a:t>Zhuo</a:t>
+            </a:r>
+            <a:r>
+              <a:rPr lang="en-US" altLang="zh-CN" sz="800" dirty="0">
+                <a:cs typeface="Times New Roman" panose="02020603050405020304" pitchFamily="18" charset="0"/>
+              </a:rPr>
+              <a:t>, W. Huang, G. F. Gao, J. Qing and G. Shang,</a:t>
+            </a:r>
+            <a:r>
+              <a:rPr lang="en-US" altLang="zh-CN" sz="800" dirty="0">
+                <a:effectLst/>
+                <a:cs typeface="Times New Roman" panose="02020603050405020304" pitchFamily="18" charset="0"/>
+              </a:rPr>
+              <a:t> SNX27 Suppresses SARS-CoV-2 Infection by Inhibiting Viral Lysosome/Late Endosome Entry. </a:t>
+            </a:r>
+            <a:r>
+              <a:rPr lang="en-US" altLang="zh-CN" sz="800" i="1" dirty="0">
+                <a:effectLst/>
+                <a:cs typeface="Times New Roman" panose="02020603050405020304" pitchFamily="18" charset="0"/>
+              </a:rPr>
+              <a:t>Proc. Natl. Acad. Sci. U. S. A. </a:t>
+            </a:r>
+            <a:r>
+              <a:rPr lang="en-US" altLang="zh-CN" sz="800" b="1" dirty="0">
+                <a:effectLst/>
+                <a:cs typeface="Times New Roman" panose="02020603050405020304" pitchFamily="18" charset="0"/>
+              </a:rPr>
+              <a:t>2022</a:t>
+            </a:r>
+            <a:r>
+              <a:rPr lang="en-US" altLang="zh-CN" sz="800" dirty="0">
+                <a:effectLst/>
+                <a:cs typeface="Times New Roman" panose="02020603050405020304" pitchFamily="18" charset="0"/>
+              </a:rPr>
+              <a:t>, </a:t>
+            </a:r>
+            <a:r>
+              <a:rPr lang="en-US" altLang="zh-CN" sz="800" i="1" dirty="0">
+                <a:effectLst/>
+                <a:cs typeface="Times New Roman" panose="02020603050405020304" pitchFamily="18" charset="0"/>
+              </a:rPr>
+              <a:t>119</a:t>
+            </a:r>
+            <a:r>
+              <a:rPr lang="en-US" altLang="zh-CN" sz="800" dirty="0">
+                <a:effectLst/>
+                <a:cs typeface="Times New Roman" panose="02020603050405020304" pitchFamily="18" charset="0"/>
+              </a:rPr>
+              <a:t>. DOI: 10.1073/pnas.2117576119</a:t>
+            </a:r>
+            <a:r>
+              <a:rPr lang="zh-CN" altLang="zh-CN" sz="800" dirty="0">
+                <a:effectLst/>
+              </a:rPr>
+              <a:t> </a:t>
             </a:r>
             <a:endParaRPr kumimoji="1" lang="zh-CN" altLang="en-US" sz="800" dirty="0"/>
+          </a:p>
+        </p:txBody>
+      </p:sp>
+      <p:sp>
+        <p:nvSpPr>
+          <p:cNvPr id="3" name="文本框 2">
+            <a:extLst>
+              <a:ext uri="{FF2B5EF4-FFF2-40B4-BE49-F238E27FC236}">
+                <a16:creationId xmlns:a16="http://schemas.microsoft.com/office/drawing/2014/main" id="{28BE00CE-EEE6-A07B-9170-9BC7D34215C9}"/>
+              </a:ext>
+            </a:extLst>
+          </p:cNvPr>
+          <p:cNvSpPr txBox="1"/>
+          <p:nvPr/>
+        </p:nvSpPr>
+        <p:spPr>
+          <a:xfrm>
+            <a:off x="268732" y="814815"/>
+            <a:ext cx="5971058" cy="369332"/>
+          </a:xfrm>
+          <a:prstGeom prst="rect">
+            <a:avLst/>
+          </a:prstGeom>
+          <a:noFill/>
+        </p:spPr>
+        <p:txBody>
+          <a:bodyPr wrap="none" rtlCol="0">
+            <a:spAutoFit/>
+          </a:bodyPr>
+          <a:lstStyle/>
+          <a:p>
+            <a:r>
+              <a:rPr kumimoji="1" lang="en-US" altLang="zh-CN" dirty="0"/>
+              <a:t>WDR81-WDR91 in Endo-</a:t>
+            </a:r>
+            <a:r>
+              <a:rPr kumimoji="1" lang="en-US" altLang="zh-CN" dirty="0" err="1"/>
+              <a:t>Lysomomal</a:t>
+            </a:r>
+            <a:r>
+              <a:rPr kumimoji="1" lang="en-US" altLang="zh-CN" dirty="0"/>
+              <a:t> Pathway of Coronaviruses</a:t>
+            </a:r>
+            <a:endParaRPr kumimoji="1" lang="zh-CN" altLang="en-US" dirty="0"/>
           </a:p>
         </p:txBody>
       </p:sp>
@@ -3746,7 +4253,7 @@
         </p:blipFill>
         <p:spPr>
           <a:xfrm>
-            <a:off x="1154969" y="954284"/>
+            <a:off x="231522" y="1316414"/>
             <a:ext cx="6699308" cy="3234932"/>
           </a:xfrm>
           <a:prstGeom prst="rect">
@@ -3768,8 +4275,8 @@
         </p:nvSpPr>
         <p:spPr>
           <a:xfrm>
-            <a:off x="1405289" y="4712056"/>
-            <a:ext cx="1164657" cy="215444"/>
+            <a:off x="7012308" y="3796514"/>
+            <a:ext cx="1953547" cy="1200329"/>
           </a:xfrm>
           <a:prstGeom prst="rect">
             <a:avLst/>
@@ -3783,14 +4290,179 @@
           <a:lstStyle/>
           <a:p>
             <a:r>
-              <a:rPr kumimoji="1" lang="en-US" altLang="zh-CN" sz="800" dirty="0" err="1"/>
+              <a:rPr lang="en-US" altLang="zh-CN" sz="800" dirty="0">
+                <a:cs typeface="Times New Roman" panose="02020603050405020304" pitchFamily="18" charset="0"/>
+              </a:rPr>
+              <a:t>SARS-CoV-2 Tropism, Entry, Replication, and Propagation: Considerations for Drug Discovery and Development, </a:t>
+            </a:r>
+            <a:r>
+              <a:rPr lang="en-US" altLang="zh-CN" sz="800" dirty="0">
+                <a:effectLst/>
+                <a:cs typeface="Times New Roman" panose="02020603050405020304" pitchFamily="18" charset="0"/>
+              </a:rPr>
+              <a:t>N. </a:t>
+            </a:r>
+            <a:r>
+              <a:rPr lang="en-US" altLang="zh-CN" sz="800" dirty="0" err="1">
+                <a:effectLst/>
+                <a:cs typeface="Times New Roman" panose="02020603050405020304" pitchFamily="18" charset="0"/>
+              </a:rPr>
               <a:t>Murgolo</a:t>
             </a:r>
             <a:r>
-              <a:rPr kumimoji="1" lang="en-US" altLang="zh-CN" sz="800" dirty="0"/>
-              <a:t> et al., 2021</a:t>
+              <a:rPr lang="en-US" altLang="zh-CN" sz="800" dirty="0">
+                <a:effectLst/>
+                <a:cs typeface="Times New Roman" panose="02020603050405020304" pitchFamily="18" charset="0"/>
+              </a:rPr>
+              <a:t>, A. G. </a:t>
+            </a:r>
+            <a:r>
+              <a:rPr lang="en-US" altLang="zh-CN" sz="800" dirty="0" err="1">
+                <a:effectLst/>
+                <a:cs typeface="Times New Roman" panose="02020603050405020304" pitchFamily="18" charset="0"/>
+              </a:rPr>
+              <a:t>Therien</a:t>
+            </a:r>
+            <a:r>
+              <a:rPr lang="en-US" altLang="zh-CN" sz="800" dirty="0">
+                <a:effectLst/>
+                <a:cs typeface="Times New Roman" panose="02020603050405020304" pitchFamily="18" charset="0"/>
+              </a:rPr>
+              <a:t>, B. Howell, D. Klein,  K. </a:t>
+            </a:r>
+            <a:r>
+              <a:rPr lang="en-US" altLang="zh-CN" sz="800" dirty="0" err="1">
+                <a:effectLst/>
+                <a:cs typeface="Times New Roman" panose="02020603050405020304" pitchFamily="18" charset="0"/>
+              </a:rPr>
+              <a:t>Koeplinger</a:t>
+            </a:r>
+            <a:r>
+              <a:rPr lang="en-US" altLang="zh-CN" sz="800" dirty="0">
+                <a:effectLst/>
+                <a:cs typeface="Times New Roman" panose="02020603050405020304" pitchFamily="18" charset="0"/>
+              </a:rPr>
+              <a:t>, L. A. Lieberman, G. C. Adam, J. Flynn, P. McKenna, G. Swaminathan, D. J. </a:t>
+            </a:r>
+            <a:r>
+              <a:rPr lang="en-US" altLang="zh-CN" sz="800" dirty="0" err="1">
+                <a:effectLst/>
+                <a:cs typeface="Times New Roman" panose="02020603050405020304" pitchFamily="18" charset="0"/>
+              </a:rPr>
+              <a:t>Hazuda</a:t>
+            </a:r>
+            <a:r>
+              <a:rPr lang="en-US" altLang="zh-CN" sz="800" dirty="0">
+                <a:cs typeface="Times New Roman" panose="02020603050405020304" pitchFamily="18" charset="0"/>
+              </a:rPr>
+              <a:t> and </a:t>
+            </a:r>
+            <a:r>
+              <a:rPr lang="en-US" altLang="zh-CN" sz="800" dirty="0">
+                <a:effectLst/>
+                <a:cs typeface="Times New Roman" panose="02020603050405020304" pitchFamily="18" charset="0"/>
+              </a:rPr>
+              <a:t>D. B. Olsen, </a:t>
+            </a:r>
+            <a:r>
+              <a:rPr lang="en-US" altLang="zh-CN" sz="800" i="1" dirty="0" err="1">
+                <a:effectLst/>
+                <a:cs typeface="Times New Roman" panose="02020603050405020304" pitchFamily="18" charset="0"/>
+              </a:rPr>
+              <a:t>PLoS</a:t>
+            </a:r>
+            <a:r>
+              <a:rPr lang="en-US" altLang="zh-CN" sz="800" i="1" dirty="0">
+                <a:effectLst/>
+                <a:cs typeface="Times New Roman" panose="02020603050405020304" pitchFamily="18" charset="0"/>
+              </a:rPr>
+              <a:t>. </a:t>
+            </a:r>
+            <a:r>
+              <a:rPr lang="en-US" altLang="zh-CN" sz="800" i="1" dirty="0" err="1">
+                <a:effectLst/>
+                <a:cs typeface="Times New Roman" panose="02020603050405020304" pitchFamily="18" charset="0"/>
+              </a:rPr>
+              <a:t>Pathog</a:t>
+            </a:r>
+            <a:r>
+              <a:rPr lang="en-US" altLang="zh-CN" sz="800" i="1" dirty="0">
+                <a:effectLst/>
+                <a:cs typeface="Times New Roman" panose="02020603050405020304" pitchFamily="18" charset="0"/>
+              </a:rPr>
+              <a:t>. </a:t>
+            </a:r>
+            <a:r>
+              <a:rPr lang="en-US" altLang="zh-CN" sz="800" b="1" dirty="0">
+                <a:effectLst/>
+                <a:cs typeface="Times New Roman" panose="02020603050405020304" pitchFamily="18" charset="0"/>
+              </a:rPr>
+              <a:t>2021</a:t>
+            </a:r>
+            <a:r>
+              <a:rPr lang="en-US" altLang="zh-CN" sz="800" dirty="0">
+                <a:effectLst/>
+                <a:cs typeface="Times New Roman" panose="02020603050405020304" pitchFamily="18" charset="0"/>
+              </a:rPr>
+              <a:t>, </a:t>
+            </a:r>
+            <a:r>
+              <a:rPr lang="en-US" altLang="zh-CN" sz="800" i="1" dirty="0">
+                <a:effectLst/>
+                <a:cs typeface="Times New Roman" panose="02020603050405020304" pitchFamily="18" charset="0"/>
+              </a:rPr>
+              <a:t>17, </a:t>
+            </a:r>
+            <a:r>
+              <a:rPr lang="en-US" altLang="zh-CN" sz="800" dirty="0">
+                <a:effectLst/>
+                <a:cs typeface="Times New Roman" panose="02020603050405020304" pitchFamily="18" charset="0"/>
+              </a:rPr>
+              <a:t>e1009225. (DOI: 10.1371/journal.ppat</a:t>
+            </a:r>
+            <a:r>
+              <a:rPr lang="en-US" altLang="zh-CN" sz="800" dirty="0">
+                <a:cs typeface="Times New Roman" panose="02020603050405020304" pitchFamily="18" charset="0"/>
+              </a:rPr>
+              <a:t>.1009225)</a:t>
             </a:r>
             <a:endParaRPr kumimoji="1" lang="zh-CN" altLang="en-US" sz="800" dirty="0"/>
+          </a:p>
+        </p:txBody>
+      </p:sp>
+      <p:sp>
+        <p:nvSpPr>
+          <p:cNvPr id="5" name="文本框 4">
+            <a:extLst>
+              <a:ext uri="{FF2B5EF4-FFF2-40B4-BE49-F238E27FC236}">
+                <a16:creationId xmlns:a16="http://schemas.microsoft.com/office/drawing/2014/main" id="{84B8507F-2E46-4B7C-CD0A-651322C1ED18}"/>
+              </a:ext>
+            </a:extLst>
+          </p:cNvPr>
+          <p:cNvSpPr txBox="1"/>
+          <p:nvPr/>
+        </p:nvSpPr>
+        <p:spPr>
+          <a:xfrm>
+            <a:off x="325932" y="896296"/>
+            <a:ext cx="3395032" cy="369332"/>
+          </a:xfrm>
+          <a:prstGeom prst="rect">
+            <a:avLst/>
+          </a:prstGeom>
+          <a:noFill/>
+        </p:spPr>
+        <p:txBody>
+          <a:bodyPr wrap="none" rtlCol="0">
+            <a:spAutoFit/>
+          </a:bodyPr>
+          <a:lstStyle/>
+          <a:p>
+            <a:r>
+              <a:rPr kumimoji="1" lang="en-US" altLang="zh-CN" dirty="0"/>
+              <a:t>Cell Entry Pathways of SARS-CoV-2</a:t>
+            </a:r>
+            <a:endParaRPr kumimoji="1" lang="zh-CN" altLang="en-US" dirty="0"/>
           </a:p>
         </p:txBody>
       </p:sp>
@@ -4298,8 +4970,8 @@
         </p:nvSpPr>
         <p:spPr>
           <a:xfrm>
-            <a:off x="1683660" y="4643594"/>
-            <a:ext cx="1211800" cy="215444"/>
+            <a:off x="1276258" y="4643594"/>
+            <a:ext cx="6863634" cy="461665"/>
           </a:xfrm>
           <a:prstGeom prst="rect">
             <a:avLst/>
@@ -4313,8 +4985,183 @@
           <a:lstStyle/>
           <a:p>
             <a:r>
-              <a:rPr kumimoji="1" lang="en-US" altLang="zh-CN" sz="800" dirty="0"/>
-              <a:t>Hoffmann et al. 2020</a:t>
+              <a:rPr lang="en-US" altLang="zh-CN" sz="800" dirty="0">
+                <a:effectLst/>
+                <a:cs typeface="Times New Roman" panose="02020603050405020304" pitchFamily="18" charset="0"/>
+              </a:rPr>
+              <a:t>SARS-CoV-2 Cell Entry Depends on ACE2 and TMPRSS2 and Is Blocked by a Clinically Proven Protease Inhibitor, M.</a:t>
+            </a:r>
+            <a:r>
+              <a:rPr lang="zh-CN" altLang="zh-CN" sz="800" dirty="0">
+                <a:effectLst/>
+              </a:rPr>
+              <a:t> </a:t>
+            </a:r>
+            <a:r>
+              <a:rPr lang="en-US" altLang="zh-CN" sz="800" dirty="0">
+                <a:effectLst/>
+                <a:cs typeface="Times New Roman" panose="02020603050405020304" pitchFamily="18" charset="0"/>
+              </a:rPr>
+              <a:t>Hoffmann, H. </a:t>
+            </a:r>
+            <a:r>
+              <a:rPr lang="en-US" altLang="zh-CN" sz="800" dirty="0" err="1">
+                <a:effectLst/>
+                <a:cs typeface="Times New Roman" panose="02020603050405020304" pitchFamily="18" charset="0"/>
+              </a:rPr>
+              <a:t>Kleine</a:t>
+            </a:r>
+            <a:r>
+              <a:rPr lang="en-US" altLang="zh-CN" sz="800" dirty="0">
+                <a:effectLst/>
+                <a:cs typeface="Times New Roman" panose="02020603050405020304" pitchFamily="18" charset="0"/>
+              </a:rPr>
+              <a:t>-Weber, S. Schroeder, N. Kruger, T. </a:t>
+            </a:r>
+            <a:r>
+              <a:rPr lang="en-US" altLang="zh-CN" sz="800" dirty="0" err="1">
+                <a:effectLst/>
+                <a:cs typeface="Times New Roman" panose="02020603050405020304" pitchFamily="18" charset="0"/>
+              </a:rPr>
+              <a:t>Herrler</a:t>
+            </a:r>
+            <a:r>
+              <a:rPr lang="en-US" altLang="zh-CN" sz="800" dirty="0">
+                <a:effectLst/>
+                <a:cs typeface="Times New Roman" panose="02020603050405020304" pitchFamily="18" charset="0"/>
+              </a:rPr>
+              <a:t>, S. </a:t>
+            </a:r>
+            <a:r>
+              <a:rPr lang="en-US" altLang="zh-CN" sz="800" dirty="0" err="1">
+                <a:effectLst/>
+                <a:cs typeface="Times New Roman" panose="02020603050405020304" pitchFamily="18" charset="0"/>
+              </a:rPr>
+              <a:t>Erichsen</a:t>
+            </a:r>
+            <a:r>
+              <a:rPr lang="en-US" altLang="zh-CN" sz="800" dirty="0">
+                <a:effectLst/>
+                <a:cs typeface="Times New Roman" panose="02020603050405020304" pitchFamily="18" charset="0"/>
+              </a:rPr>
+              <a:t>, T. S. </a:t>
+            </a:r>
+            <a:r>
+              <a:rPr lang="en-US" altLang="zh-CN" sz="800" dirty="0" err="1">
+                <a:effectLst/>
+                <a:cs typeface="Times New Roman" panose="02020603050405020304" pitchFamily="18" charset="0"/>
+              </a:rPr>
+              <a:t>Schiergens</a:t>
+            </a:r>
+            <a:r>
+              <a:rPr lang="en-US" altLang="zh-CN" sz="800" dirty="0">
+                <a:effectLst/>
+                <a:cs typeface="Times New Roman" panose="02020603050405020304" pitchFamily="18" charset="0"/>
+              </a:rPr>
+              <a:t>, G.  </a:t>
+            </a:r>
+            <a:r>
+              <a:rPr lang="en-US" altLang="zh-CN" sz="800" dirty="0" err="1">
+                <a:effectLst/>
+                <a:cs typeface="Times New Roman" panose="02020603050405020304" pitchFamily="18" charset="0"/>
+              </a:rPr>
+              <a:t>Herrler</a:t>
+            </a:r>
+            <a:r>
+              <a:rPr lang="en-US" altLang="zh-CN" sz="800" dirty="0">
+                <a:effectLst/>
+                <a:cs typeface="Times New Roman" panose="02020603050405020304" pitchFamily="18" charset="0"/>
+              </a:rPr>
+              <a:t>, N. H. Wu, </a:t>
+            </a:r>
+            <a:r>
+              <a:rPr lang="en-US" altLang="zh-CN" sz="800" dirty="0">
+                <a:cs typeface="Times New Roman" panose="02020603050405020304" pitchFamily="18" charset="0"/>
+              </a:rPr>
+              <a:t>A. </a:t>
+            </a:r>
+            <a:r>
+              <a:rPr lang="en-US" altLang="zh-CN" sz="800" dirty="0" err="1">
+                <a:effectLst/>
+                <a:cs typeface="Times New Roman" panose="02020603050405020304" pitchFamily="18" charset="0"/>
+              </a:rPr>
+              <a:t>Nitsche</a:t>
+            </a:r>
+            <a:r>
+              <a:rPr lang="en-US" altLang="zh-CN" sz="800" dirty="0">
+                <a:effectLst/>
+                <a:cs typeface="Times New Roman" panose="02020603050405020304" pitchFamily="18" charset="0"/>
+              </a:rPr>
+              <a:t>, M. A. Muller, C. </a:t>
+            </a:r>
+            <a:r>
+              <a:rPr lang="en-US" altLang="zh-CN" sz="800" dirty="0" err="1">
+                <a:effectLst/>
+                <a:cs typeface="Times New Roman" panose="02020603050405020304" pitchFamily="18" charset="0"/>
+              </a:rPr>
+              <a:t>Drosten</a:t>
+            </a:r>
+            <a:r>
+              <a:rPr lang="en-US" altLang="zh-CN" sz="800" dirty="0">
+                <a:cs typeface="Times New Roman" panose="02020603050405020304" pitchFamily="18" charset="0"/>
+              </a:rPr>
+              <a:t> and</a:t>
+            </a:r>
+            <a:r>
+              <a:rPr lang="en-US" altLang="zh-CN" sz="800" dirty="0">
+                <a:effectLst/>
+                <a:cs typeface="Times New Roman" panose="02020603050405020304" pitchFamily="18" charset="0"/>
+              </a:rPr>
+              <a:t> S. </a:t>
+            </a:r>
+            <a:r>
+              <a:rPr lang="en-US" altLang="zh-CN" sz="800" dirty="0" err="1">
+                <a:effectLst/>
+                <a:cs typeface="Times New Roman" panose="02020603050405020304" pitchFamily="18" charset="0"/>
+              </a:rPr>
+              <a:t>Pohlmann</a:t>
+            </a:r>
+            <a:r>
+              <a:rPr lang="en-US" altLang="zh-CN" sz="800" dirty="0">
+                <a:effectLst/>
+                <a:cs typeface="Times New Roman" panose="02020603050405020304" pitchFamily="18" charset="0"/>
+              </a:rPr>
+              <a:t>, </a:t>
+            </a:r>
+            <a:r>
+              <a:rPr lang="en-US" altLang="zh-CN" sz="800" i="1" dirty="0">
+                <a:effectLst/>
+                <a:cs typeface="Times New Roman" panose="02020603050405020304" pitchFamily="18" charset="0"/>
+              </a:rPr>
+              <a:t>Cell. </a:t>
+            </a:r>
+            <a:r>
+              <a:rPr lang="en-US" altLang="zh-CN" sz="800" b="1" dirty="0">
+                <a:effectLst/>
+                <a:cs typeface="Times New Roman" panose="02020603050405020304" pitchFamily="18" charset="0"/>
+              </a:rPr>
+              <a:t>2020</a:t>
+            </a:r>
+            <a:r>
+              <a:rPr lang="en-US" altLang="zh-CN" sz="800" dirty="0">
+                <a:effectLst/>
+                <a:cs typeface="Times New Roman" panose="02020603050405020304" pitchFamily="18" charset="0"/>
+              </a:rPr>
+              <a:t>, </a:t>
+            </a:r>
+            <a:r>
+              <a:rPr lang="en-US" altLang="zh-CN" sz="800" i="1" dirty="0">
+                <a:effectLst/>
+                <a:cs typeface="Times New Roman" panose="02020603050405020304" pitchFamily="18" charset="0"/>
+              </a:rPr>
+              <a:t>181,</a:t>
+            </a:r>
+            <a:r>
+              <a:rPr lang="en-US" altLang="zh-CN" sz="800" dirty="0">
+                <a:effectLst/>
+                <a:cs typeface="Times New Roman" panose="02020603050405020304" pitchFamily="18" charset="0"/>
+              </a:rPr>
+              <a:t> 271-280 (DOI: 10.1016/j.cell.2020.02.052)</a:t>
             </a:r>
             <a:endParaRPr kumimoji="1" lang="zh-CN" altLang="en-US" sz="800" dirty="0"/>
           </a:p>
@@ -4397,13 +5244,13 @@
         </p:nvPicPr>
         <p:blipFill rotWithShape="1">
           <a:blip r:embed="rId3"/>
-          <a:srcRect l="51636" t="37546" b="18897"/>
+          <a:srcRect l="51636" t="37547" b="21727"/>
           <a:stretch/>
         </p:blipFill>
         <p:spPr>
           <a:xfrm>
-            <a:off x="258879" y="1685819"/>
-            <a:ext cx="4313121" cy="3241681"/>
+            <a:off x="258879" y="1685820"/>
+            <a:ext cx="4313121" cy="3031036"/>
           </a:xfrm>
           <a:prstGeom prst="rect">
             <a:avLst/>
@@ -4426,13 +5273,13 @@
         </p:nvPicPr>
         <p:blipFill rotWithShape="1">
           <a:blip r:embed="rId3"/>
-          <a:srcRect l="68992" r="-345" b="91643"/>
+          <a:srcRect l="68993" t="2330" r="123" b="91643"/>
           <a:stretch/>
         </p:blipFill>
         <p:spPr>
           <a:xfrm>
-            <a:off x="1579253" y="919519"/>
-            <a:ext cx="2762451" cy="614470"/>
+            <a:off x="1579253" y="1090881"/>
+            <a:ext cx="2721143" cy="443108"/>
           </a:xfrm>
           <a:prstGeom prst="rect">
             <a:avLst/>
@@ -4453,8 +5300,8 @@
         </p:nvSpPr>
         <p:spPr>
           <a:xfrm>
-            <a:off x="1683660" y="4643594"/>
-            <a:ext cx="1211800" cy="215444"/>
+            <a:off x="273022" y="4588300"/>
+            <a:ext cx="4588686" cy="584775"/>
           </a:xfrm>
           <a:prstGeom prst="rect">
             <a:avLst/>
@@ -4468,8 +5315,183 @@
           <a:lstStyle/>
           <a:p>
             <a:r>
-              <a:rPr kumimoji="1" lang="en-US" altLang="zh-CN" sz="800" dirty="0"/>
-              <a:t>Hoffmann et al. 2020</a:t>
+              <a:rPr lang="en-US" altLang="zh-CN" sz="800" dirty="0">
+                <a:effectLst/>
+                <a:cs typeface="Times New Roman" panose="02020603050405020304" pitchFamily="18" charset="0"/>
+              </a:rPr>
+              <a:t>SARS-CoV-2 Cell Entry Depends on ACE2 and TMPRSS2 and Is Blocked by a Clinically Proven Protease Inhibitor, M.</a:t>
+            </a:r>
+            <a:r>
+              <a:rPr lang="zh-CN" altLang="zh-CN" sz="800" dirty="0">
+                <a:effectLst/>
+              </a:rPr>
+              <a:t> </a:t>
+            </a:r>
+            <a:r>
+              <a:rPr lang="en-US" altLang="zh-CN" sz="800" dirty="0">
+                <a:effectLst/>
+                <a:cs typeface="Times New Roman" panose="02020603050405020304" pitchFamily="18" charset="0"/>
+              </a:rPr>
+              <a:t>Hoffmann, H. </a:t>
+            </a:r>
+            <a:r>
+              <a:rPr lang="en-US" altLang="zh-CN" sz="800" dirty="0" err="1">
+                <a:effectLst/>
+                <a:cs typeface="Times New Roman" panose="02020603050405020304" pitchFamily="18" charset="0"/>
+              </a:rPr>
+              <a:t>Kleine</a:t>
+            </a:r>
+            <a:r>
+              <a:rPr lang="en-US" altLang="zh-CN" sz="800" dirty="0">
+                <a:effectLst/>
+                <a:cs typeface="Times New Roman" panose="02020603050405020304" pitchFamily="18" charset="0"/>
+              </a:rPr>
+              <a:t>-Weber, S. Schroeder, N. Kruger, T. </a:t>
+            </a:r>
+            <a:r>
+              <a:rPr lang="en-US" altLang="zh-CN" sz="800" dirty="0" err="1">
+                <a:effectLst/>
+                <a:cs typeface="Times New Roman" panose="02020603050405020304" pitchFamily="18" charset="0"/>
+              </a:rPr>
+              <a:t>Herrler</a:t>
+            </a:r>
+            <a:r>
+              <a:rPr lang="en-US" altLang="zh-CN" sz="800" dirty="0">
+                <a:effectLst/>
+                <a:cs typeface="Times New Roman" panose="02020603050405020304" pitchFamily="18" charset="0"/>
+              </a:rPr>
+              <a:t>, S. </a:t>
+            </a:r>
+            <a:r>
+              <a:rPr lang="en-US" altLang="zh-CN" sz="800" dirty="0" err="1">
+                <a:effectLst/>
+                <a:cs typeface="Times New Roman" panose="02020603050405020304" pitchFamily="18" charset="0"/>
+              </a:rPr>
+              <a:t>Erichsen</a:t>
+            </a:r>
+            <a:r>
+              <a:rPr lang="en-US" altLang="zh-CN" sz="800" dirty="0">
+                <a:effectLst/>
+                <a:cs typeface="Times New Roman" panose="02020603050405020304" pitchFamily="18" charset="0"/>
+              </a:rPr>
+              <a:t>, T. S. </a:t>
+            </a:r>
+            <a:r>
+              <a:rPr lang="en-US" altLang="zh-CN" sz="800" dirty="0" err="1">
+                <a:effectLst/>
+                <a:cs typeface="Times New Roman" panose="02020603050405020304" pitchFamily="18" charset="0"/>
+              </a:rPr>
+              <a:t>Schiergens</a:t>
+            </a:r>
+            <a:r>
+              <a:rPr lang="en-US" altLang="zh-CN" sz="800" dirty="0">
+                <a:effectLst/>
+                <a:cs typeface="Times New Roman" panose="02020603050405020304" pitchFamily="18" charset="0"/>
+              </a:rPr>
+              <a:t>, G.  </a:t>
+            </a:r>
+            <a:r>
+              <a:rPr lang="en-US" altLang="zh-CN" sz="800" dirty="0" err="1">
+                <a:effectLst/>
+                <a:cs typeface="Times New Roman" panose="02020603050405020304" pitchFamily="18" charset="0"/>
+              </a:rPr>
+              <a:t>Herrler</a:t>
+            </a:r>
+            <a:r>
+              <a:rPr lang="en-US" altLang="zh-CN" sz="800" dirty="0">
+                <a:effectLst/>
+                <a:cs typeface="Times New Roman" panose="02020603050405020304" pitchFamily="18" charset="0"/>
+              </a:rPr>
+              <a:t>, N. H. Wu, </a:t>
+            </a:r>
+            <a:r>
+              <a:rPr lang="en-US" altLang="zh-CN" sz="800" dirty="0">
+                <a:cs typeface="Times New Roman" panose="02020603050405020304" pitchFamily="18" charset="0"/>
+              </a:rPr>
+              <a:t>A. </a:t>
+            </a:r>
+            <a:r>
+              <a:rPr lang="en-US" altLang="zh-CN" sz="800" dirty="0" err="1">
+                <a:effectLst/>
+                <a:cs typeface="Times New Roman" panose="02020603050405020304" pitchFamily="18" charset="0"/>
+              </a:rPr>
+              <a:t>Nitsche</a:t>
+            </a:r>
+            <a:r>
+              <a:rPr lang="en-US" altLang="zh-CN" sz="800" dirty="0">
+                <a:effectLst/>
+                <a:cs typeface="Times New Roman" panose="02020603050405020304" pitchFamily="18" charset="0"/>
+              </a:rPr>
+              <a:t>, M. A. Muller, C. </a:t>
+            </a:r>
+            <a:r>
+              <a:rPr lang="en-US" altLang="zh-CN" sz="800" dirty="0" err="1">
+                <a:effectLst/>
+                <a:cs typeface="Times New Roman" panose="02020603050405020304" pitchFamily="18" charset="0"/>
+              </a:rPr>
+              <a:t>Drosten</a:t>
+            </a:r>
+            <a:r>
+              <a:rPr lang="en-US" altLang="zh-CN" sz="800" dirty="0">
+                <a:cs typeface="Times New Roman" panose="02020603050405020304" pitchFamily="18" charset="0"/>
+              </a:rPr>
+              <a:t> and</a:t>
+            </a:r>
+            <a:r>
+              <a:rPr lang="en-US" altLang="zh-CN" sz="800" dirty="0">
+                <a:effectLst/>
+                <a:cs typeface="Times New Roman" panose="02020603050405020304" pitchFamily="18" charset="0"/>
+              </a:rPr>
+              <a:t> S. </a:t>
+            </a:r>
+            <a:r>
+              <a:rPr lang="en-US" altLang="zh-CN" sz="800" dirty="0" err="1">
+                <a:effectLst/>
+                <a:cs typeface="Times New Roman" panose="02020603050405020304" pitchFamily="18" charset="0"/>
+              </a:rPr>
+              <a:t>Pohlmann</a:t>
+            </a:r>
+            <a:r>
+              <a:rPr lang="en-US" altLang="zh-CN" sz="800" dirty="0">
+                <a:effectLst/>
+                <a:cs typeface="Times New Roman" panose="02020603050405020304" pitchFamily="18" charset="0"/>
+              </a:rPr>
+              <a:t>, </a:t>
+            </a:r>
+            <a:r>
+              <a:rPr lang="en-US" altLang="zh-CN" sz="800" i="1" dirty="0">
+                <a:effectLst/>
+                <a:cs typeface="Times New Roman" panose="02020603050405020304" pitchFamily="18" charset="0"/>
+              </a:rPr>
+              <a:t>Cell. </a:t>
+            </a:r>
+            <a:r>
+              <a:rPr lang="en-US" altLang="zh-CN" sz="800" b="1" dirty="0">
+                <a:effectLst/>
+                <a:cs typeface="Times New Roman" panose="02020603050405020304" pitchFamily="18" charset="0"/>
+              </a:rPr>
+              <a:t>2020</a:t>
+            </a:r>
+            <a:r>
+              <a:rPr lang="en-US" altLang="zh-CN" sz="800" dirty="0">
+                <a:effectLst/>
+                <a:cs typeface="Times New Roman" panose="02020603050405020304" pitchFamily="18" charset="0"/>
+              </a:rPr>
+              <a:t>, </a:t>
+            </a:r>
+            <a:r>
+              <a:rPr lang="en-US" altLang="zh-CN" sz="800" i="1" dirty="0">
+                <a:effectLst/>
+                <a:cs typeface="Times New Roman" panose="02020603050405020304" pitchFamily="18" charset="0"/>
+              </a:rPr>
+              <a:t>181,</a:t>
+            </a:r>
+            <a:r>
+              <a:rPr lang="en-US" altLang="zh-CN" sz="800" dirty="0">
+                <a:effectLst/>
+                <a:cs typeface="Times New Roman" panose="02020603050405020304" pitchFamily="18" charset="0"/>
+              </a:rPr>
+              <a:t> 271-280 (DOI: 10.1016/j.cell.2020.02.052)</a:t>
             </a:r>
             <a:endParaRPr kumimoji="1" lang="zh-CN" altLang="en-US" sz="800" dirty="0"/>
           </a:p>
@@ -4497,7 +5519,7 @@
         </p:blipFill>
         <p:spPr>
           <a:xfrm>
-            <a:off x="4712891" y="1199519"/>
+            <a:off x="4712891" y="1090881"/>
             <a:ext cx="4191000" cy="3378200"/>
           </a:xfrm>
           <a:prstGeom prst="rect">
@@ -4519,8 +5541,8 @@
         </p:nvSpPr>
         <p:spPr>
           <a:xfrm>
-            <a:off x="5527708" y="4643594"/>
-            <a:ext cx="1211800" cy="215444"/>
+            <a:off x="4861708" y="4553064"/>
+            <a:ext cx="4105553" cy="584775"/>
           </a:xfrm>
           <a:prstGeom prst="rect">
             <a:avLst/>
@@ -4534,10 +5556,194 @@
           <a:lstStyle/>
           <a:p>
             <a:r>
-              <a:rPr kumimoji="1" lang="en-US" altLang="zh-CN" sz="800" dirty="0"/>
-              <a:t>Khan et al., 2021</a:t>
+              <a:rPr lang="en-US" altLang="zh-CN" sz="800" dirty="0">
+                <a:effectLst/>
+                <a:cs typeface="Times New Roman" panose="02020603050405020304" pitchFamily="18" charset="0"/>
+              </a:rPr>
+              <a:t>TMPRSS2 Promotes SARS-CoV-2 Evasion from NCOA7-Mediated Restriction, H. Khan, H. </a:t>
+            </a:r>
+            <a:r>
+              <a:rPr lang="en-US" altLang="zh-CN" sz="800" dirty="0" err="1">
+                <a:effectLst/>
+                <a:cs typeface="Times New Roman" panose="02020603050405020304" pitchFamily="18" charset="0"/>
+              </a:rPr>
+              <a:t>Winstone</a:t>
+            </a:r>
+            <a:r>
+              <a:rPr lang="en-US" altLang="zh-CN" sz="800" dirty="0">
+                <a:effectLst/>
+                <a:cs typeface="Times New Roman" panose="02020603050405020304" pitchFamily="18" charset="0"/>
+              </a:rPr>
+              <a:t>, </a:t>
+            </a:r>
+            <a:r>
+              <a:rPr lang="en-US" altLang="zh-CN" sz="800" dirty="0">
+                <a:cs typeface="Times New Roman" panose="02020603050405020304" pitchFamily="18" charset="0"/>
+              </a:rPr>
+              <a:t>J. M. </a:t>
+            </a:r>
+            <a:r>
+              <a:rPr lang="en-US" altLang="zh-CN" sz="800" dirty="0">
+                <a:effectLst/>
+                <a:cs typeface="Times New Roman" panose="02020603050405020304" pitchFamily="18" charset="0"/>
+              </a:rPr>
+              <a:t>Jimenez-</a:t>
+            </a:r>
+            <a:r>
+              <a:rPr lang="en-US" altLang="zh-CN" sz="800" dirty="0" err="1">
+                <a:effectLst/>
+                <a:cs typeface="Times New Roman" panose="02020603050405020304" pitchFamily="18" charset="0"/>
+              </a:rPr>
+              <a:t>Guardeno</a:t>
+            </a:r>
+            <a:r>
+              <a:rPr lang="en-US" altLang="zh-CN" sz="800" dirty="0">
+                <a:effectLst/>
+                <a:cs typeface="Times New Roman" panose="02020603050405020304" pitchFamily="18" charset="0"/>
+              </a:rPr>
+              <a:t>, C. Graham, K. J. </a:t>
+            </a:r>
+            <a:r>
+              <a:rPr lang="en-US" altLang="zh-CN" sz="800" dirty="0" err="1">
+                <a:effectLst/>
+                <a:cs typeface="Times New Roman" panose="02020603050405020304" pitchFamily="18" charset="0"/>
+              </a:rPr>
+              <a:t>Doores</a:t>
+            </a:r>
+            <a:r>
+              <a:rPr lang="en-US" altLang="zh-CN" sz="800" dirty="0">
+                <a:effectLst/>
+                <a:cs typeface="Times New Roman" panose="02020603050405020304" pitchFamily="18" charset="0"/>
+              </a:rPr>
+              <a:t>, C. Goujon, D. A. Matthews, A. D. Davidson, S. J. </a:t>
+            </a:r>
+            <a:r>
+              <a:rPr lang="en-US" altLang="zh-CN" sz="800" dirty="0" err="1">
+                <a:effectLst/>
+                <a:cs typeface="Times New Roman" panose="02020603050405020304" pitchFamily="18" charset="0"/>
+              </a:rPr>
+              <a:t>Rihn</a:t>
+            </a:r>
+            <a:r>
+              <a:rPr lang="en-US" altLang="zh-CN" sz="800" dirty="0">
+                <a:effectLst/>
+                <a:cs typeface="Times New Roman" panose="02020603050405020304" pitchFamily="18" charset="0"/>
+              </a:rPr>
+              <a:t> and M. </a:t>
+            </a:r>
+            <a:r>
+              <a:rPr lang="en-US" altLang="zh-CN" sz="800" dirty="0" err="1">
+                <a:effectLst/>
+                <a:cs typeface="Times New Roman" panose="02020603050405020304" pitchFamily="18" charset="0"/>
+              </a:rPr>
+              <a:t>Palmarini</a:t>
+            </a:r>
+            <a:r>
+              <a:rPr lang="en-US" altLang="zh-CN" sz="800" dirty="0">
+                <a:effectLst/>
+                <a:cs typeface="Times New Roman" panose="02020603050405020304" pitchFamily="18" charset="0"/>
+              </a:rPr>
+              <a:t>,  </a:t>
+            </a:r>
+            <a:r>
+              <a:rPr lang="en-US" altLang="zh-CN" sz="800" i="1" dirty="0" err="1">
+                <a:effectLst/>
+                <a:cs typeface="Times New Roman" panose="02020603050405020304" pitchFamily="18" charset="0"/>
+              </a:rPr>
+              <a:t>PLoS</a:t>
+            </a:r>
+            <a:r>
+              <a:rPr lang="en-US" altLang="zh-CN" sz="800" i="1" dirty="0">
+                <a:effectLst/>
+                <a:cs typeface="Times New Roman" panose="02020603050405020304" pitchFamily="18" charset="0"/>
+              </a:rPr>
+              <a:t>. </a:t>
+            </a:r>
+            <a:r>
+              <a:rPr lang="en-US" altLang="zh-CN" sz="800" i="1" dirty="0" err="1">
+                <a:effectLst/>
+                <a:cs typeface="Times New Roman" panose="02020603050405020304" pitchFamily="18" charset="0"/>
+              </a:rPr>
+              <a:t>Pathog</a:t>
+            </a:r>
+            <a:r>
+              <a:rPr lang="en-US" altLang="zh-CN" sz="800" i="1" dirty="0">
+                <a:effectLst/>
+                <a:cs typeface="Times New Roman" panose="02020603050405020304" pitchFamily="18" charset="0"/>
+              </a:rPr>
+              <a:t>. </a:t>
+            </a:r>
+            <a:r>
+              <a:rPr lang="en-US" altLang="zh-CN" sz="800" b="1" dirty="0">
+                <a:effectLst/>
+                <a:cs typeface="Times New Roman" panose="02020603050405020304" pitchFamily="18" charset="0"/>
+              </a:rPr>
+              <a:t>2021</a:t>
+            </a:r>
+            <a:r>
+              <a:rPr lang="en-US" altLang="zh-CN" sz="800" dirty="0">
+                <a:effectLst/>
+                <a:cs typeface="Times New Roman" panose="02020603050405020304" pitchFamily="18" charset="0"/>
+              </a:rPr>
+              <a:t>, </a:t>
+            </a:r>
+            <a:r>
+              <a:rPr lang="en-US" altLang="zh-CN" sz="800" i="1" dirty="0">
+                <a:effectLst/>
+                <a:cs typeface="Times New Roman" panose="02020603050405020304" pitchFamily="18" charset="0"/>
+              </a:rPr>
+              <a:t>17</a:t>
+            </a:r>
+            <a:r>
+              <a:rPr lang="en-US" altLang="zh-CN" sz="800" dirty="0">
+                <a:effectLst/>
+                <a:cs typeface="Times New Roman" panose="02020603050405020304" pitchFamily="18" charset="0"/>
+              </a:rPr>
+              <a:t>, e1009820. (DOI: 10.1371/journal.ppat.1009820)</a:t>
+            </a:r>
+            <a:r>
+              <a:rPr lang="zh-CN" altLang="zh-CN" sz="800" dirty="0">
+                <a:effectLst/>
+              </a:rPr>
+              <a:t> </a:t>
             </a:r>
             <a:endParaRPr kumimoji="1" lang="zh-CN" altLang="en-US" sz="800" dirty="0"/>
+          </a:p>
+        </p:txBody>
+      </p:sp>
+      <p:sp>
+        <p:nvSpPr>
+          <p:cNvPr id="5" name="文本框 4">
+            <a:extLst>
+              <a:ext uri="{FF2B5EF4-FFF2-40B4-BE49-F238E27FC236}">
+                <a16:creationId xmlns:a16="http://schemas.microsoft.com/office/drawing/2014/main" id="{2DCA3585-29E9-5479-0E01-38C64A2EA446}"/>
+              </a:ext>
+            </a:extLst>
+          </p:cNvPr>
+          <p:cNvSpPr txBox="1"/>
+          <p:nvPr/>
+        </p:nvSpPr>
+        <p:spPr>
+          <a:xfrm>
+            <a:off x="264660" y="792288"/>
+            <a:ext cx="7959295" cy="369332"/>
+          </a:xfrm>
+          <a:prstGeom prst="rect">
+            <a:avLst/>
+          </a:prstGeom>
+          <a:noFill/>
+        </p:spPr>
+        <p:txBody>
+          <a:bodyPr wrap="none" rtlCol="0">
+            <a:spAutoFit/>
+          </a:bodyPr>
+          <a:lstStyle/>
+          <a:p>
+            <a:r>
+              <a:rPr kumimoji="1" lang="en-US" altLang="zh-CN" dirty="0"/>
+              <a:t>Confirmation of Presence of Endo-Lysosomal in Human Cells by Infection Decrease </a:t>
+            </a:r>
+            <a:endParaRPr kumimoji="1" lang="zh-CN" altLang="en-US" dirty="0"/>
           </a:p>
         </p:txBody>
       </p:sp>
@@ -4616,8 +5822,8 @@
         </p:nvSpPr>
         <p:spPr>
           <a:xfrm>
-            <a:off x="525101" y="1023042"/>
-            <a:ext cx="7921782" cy="923330"/>
+            <a:off x="525101" y="1231269"/>
+            <a:ext cx="7921782" cy="2308324"/>
           </a:xfrm>
           <a:prstGeom prst="rect">
             <a:avLst/>
@@ -4646,7 +5852,41 @@
             </a:pPr>
             <a:r>
               <a:rPr kumimoji="1" lang="en-US" altLang="zh-CN" dirty="0"/>
-              <a:t>Infection of SARS-CoV-2 can potentially prevented by inhibiting the WDR81-WDR91</a:t>
+              <a:t>Infection of SARS-CoV-2 can be potentially prevented by inhibiting the WDR81-WDR91</a:t>
+            </a:r>
+          </a:p>
+          <a:p>
+            <a:pPr marL="285750" indent="-285750">
+              <a:buFont typeface="Arial" panose="020B0604020202020204" pitchFamily="34" charset="0"/>
+              <a:buChar char="•"/>
+            </a:pPr>
+            <a:endParaRPr kumimoji="1" lang="en-US" altLang="zh-CN" dirty="0"/>
+          </a:p>
+          <a:p>
+            <a:pPr marL="285750" indent="-285750">
+              <a:buFont typeface="Arial" panose="020B0604020202020204" pitchFamily="34" charset="0"/>
+              <a:buChar char="•"/>
+            </a:pPr>
+            <a:endParaRPr kumimoji="1" lang="en-US" altLang="zh-CN" dirty="0"/>
+          </a:p>
+          <a:p>
+            <a:pPr marL="285750" indent="-285750">
+              <a:buFont typeface="Arial" panose="020B0604020202020204" pitchFamily="34" charset="0"/>
+              <a:buChar char="•"/>
+            </a:pPr>
+            <a:r>
+              <a:rPr kumimoji="1" lang="en-US" altLang="zh-CN" dirty="0"/>
+              <a:t>Developmental problems—Inhibition of WDR81 may cause hippocampal dysfunction</a:t>
+            </a:r>
+          </a:p>
+          <a:p>
+            <a:pPr marL="285750" indent="-285750">
+              <a:buFont typeface="Arial" panose="020B0604020202020204" pitchFamily="34" charset="0"/>
+              <a:buChar char="•"/>
+            </a:pPr>
+            <a:r>
+              <a:rPr kumimoji="1" lang="en-US" altLang="zh-CN" dirty="0"/>
+              <a:t>Identification of WDR81-WDR91 binding site—C terminal of WDR81</a:t>
             </a:r>
           </a:p>
         </p:txBody>

</xml_diff>